<commit_message>
Update 2 Academic Writing and Oral Presentation.pptx
</commit_message>
<xml_diff>
--- a/web/b25/2 Academic Writing and Oral Presentation.pptx
+++ b/web/b25/2 Academic Writing and Oral Presentation.pptx
@@ -7435,15 +7435,7 @@
             </a:r>
             <a:r>
               <a:rPr lang="en-GB" altLang="da-DK" sz="2800" dirty="0" smtClean="0"/>
-              <a:t>write an academic paper and </a:t>
-            </a:r>
-            <a:r>
-              <a:rPr lang="en-GB" altLang="da-DK" sz="2800" dirty="0" smtClean="0"/>
-              <a:t>make an </a:t>
-            </a:r>
-            <a:r>
-              <a:rPr lang="en-GB" altLang="da-DK" sz="2800" dirty="0" smtClean="0"/>
-              <a:t>oral presentation of it?</a:t>
+              <a:t>write an academic paper and make an oral presentation of it?</a:t>
             </a:r>
             <a:endParaRPr lang="en-GB" altLang="da-DK" sz="2800" dirty="0"/>
           </a:p>
@@ -7970,15 +7962,7 @@
             </a:pPr>
             <a:r>
               <a:rPr lang="en-GB" altLang="da-DK" sz="1400" spc="-30" dirty="0" smtClean="0"/>
-              <a:t>Some of the material </a:t>
-            </a:r>
-            <a:r>
-              <a:rPr lang="en-GB" altLang="da-DK" sz="1400" spc="-30" dirty="0" smtClean="0"/>
-              <a:t>in Part 1 of this talk is </a:t>
-            </a:r>
-            <a:r>
-              <a:rPr lang="en-GB" altLang="da-DK" sz="1400" spc="-30" dirty="0" smtClean="0"/>
-              <a:t>inspired by a similar presentation by Henrik Korsgaard and by a note on bachelor projects in physics written by Peter Balling and Hans Kjeldsen</a:t>
+              <a:t>Some of the material in Part 1 of this talk is inspired by a similar presentation by Henrik Korsgaard and by a note on bachelor projects in physics written by Peter Balling and Hans Kjeldsen</a:t>
             </a:r>
             <a:endParaRPr lang="en-GB" altLang="da-DK" sz="1400" spc="-30" dirty="0"/>
           </a:p>
@@ -10755,7 +10739,15 @@
             </a:r>
             <a:r>
               <a:rPr lang="en-US" sz="1600" dirty="0"/>
-              <a:t> whether this is the work of </a:t>
+              <a:t> </a:t>
+            </a:r>
+            <a:r>
+              <a:rPr lang="en-US" sz="1600" dirty="0" smtClean="0"/>
+              <a:t>for the reader whether </a:t>
+            </a:r>
+            <a:r>
+              <a:rPr lang="en-US" sz="1600" dirty="0"/>
+              <a:t>this is the work of </a:t>
             </a:r>
             <a:r>
               <a:rPr lang="en-US" sz="1600" dirty="0" smtClean="0"/>
@@ -11503,7 +11495,7 @@
         <p:spPr>
           <a:xfrm>
             <a:off x="487620" y="1052736"/>
-            <a:ext cx="8476868" cy="4176464"/>
+            <a:ext cx="8476868" cy="5805264"/>
           </a:xfrm>
           <a:noFill/>
         </p:spPr>
@@ -11796,6 +11788,14 @@
             <a:r>
               <a:rPr lang="en-US" sz="1600" dirty="0" err="1" smtClean="0"/>
               <a:t>splelchekc</a:t>
+            </a:r>
+            <a:r>
+              <a:rPr lang="en-US" sz="1600" dirty="0"/>
+              <a:t> (British English ≠ US </a:t>
+            </a:r>
+            <a:r>
+              <a:rPr lang="en-US" sz="1600" dirty="0" smtClean="0"/>
+              <a:t>English)</a:t>
             </a:r>
             <a:endParaRPr lang="en-US" sz="1600" dirty="0" smtClean="0"/>
           </a:p>
@@ -16291,7 +16291,23 @@
                   <a:srgbClr val="0000CC"/>
                 </a:solidFill>
               </a:rPr>
-              <a:t>You will need good figures for your oral presentation</a:t>
+              <a:t>You will </a:t>
+            </a:r>
+            <a:r>
+              <a:rPr lang="en-GB" altLang="da-DK" sz="1200" b="1" dirty="0" smtClean="0">
+                <a:solidFill>
+                  <a:srgbClr val="0000CC"/>
+                </a:solidFill>
+              </a:rPr>
+              <a:t>also need </a:t>
+            </a:r>
+            <a:r>
+              <a:rPr lang="en-GB" altLang="da-DK" sz="1200" b="1" dirty="0" smtClean="0">
+                <a:solidFill>
+                  <a:srgbClr val="0000CC"/>
+                </a:solidFill>
+              </a:rPr>
+              <a:t>good figures for your oral presentation</a:t>
             </a:r>
           </a:p>
           <a:p>
@@ -17226,40 +17242,13 @@
                   <a:srgbClr val="A50021"/>
                 </a:solidFill>
               </a:rPr>
-              <a:t>Writing </a:t>
-            </a:r>
-            <a:r>
-              <a:rPr lang="en-GB" altLang="da-DK" sz="1800" b="1" dirty="0">
-                <a:solidFill>
-                  <a:srgbClr val="A50021"/>
-                </a:solidFill>
-              </a:rPr>
-              <a:t>is a </a:t>
-            </a:r>
-            <a:r>
-              <a:rPr lang="en-GB" altLang="da-DK" sz="1800" b="1" dirty="0" smtClean="0">
-                <a:solidFill>
-                  <a:srgbClr val="008000"/>
-                </a:solidFill>
-              </a:rPr>
-              <a:t>very</a:t>
-            </a:r>
-            <a:r>
-              <a:rPr lang="en-GB" altLang="da-DK" sz="1800" b="1" dirty="0" smtClean="0">
-                <a:solidFill>
-                  <a:srgbClr val="A50021"/>
-                </a:solidFill>
-              </a:rPr>
-              <a:t> </a:t>
-            </a:r>
-            <a:r>
-              <a:rPr lang="en-GB" altLang="da-DK" sz="1800" b="1" dirty="0">
-                <a:solidFill>
-                  <a:srgbClr val="A50021"/>
-                </a:solidFill>
-              </a:rPr>
-              <a:t>difficult craft</a:t>
-            </a:r>
+              <a:t>Writing a good scientific paper is difficult</a:t>
+            </a:r>
+            <a:endParaRPr lang="en-GB" altLang="da-DK" sz="1800" b="1" dirty="0">
+              <a:solidFill>
+                <a:srgbClr val="A50021"/>
+              </a:solidFill>
+            </a:endParaRPr>
           </a:p>
           <a:p>
             <a:pPr marL="728663" lvl="1" indent="-271463">
@@ -17764,11 +17753,7 @@
             </a:r>
             <a:r>
               <a:rPr lang="en-GB" altLang="da-DK" sz="2800" dirty="0" smtClean="0"/>
-              <a:t>write an academic </a:t>
-            </a:r>
-            <a:r>
-              <a:rPr lang="en-GB" altLang="da-DK" sz="2800" dirty="0" smtClean="0"/>
-              <a:t>paper</a:t>
+              <a:t>write an academic paper</a:t>
             </a:r>
             <a:endParaRPr lang="en-GB" altLang="da-DK" sz="2800" dirty="0"/>
           </a:p>
@@ -17881,19 +17866,19 @@
               <a:defRPr sz="3072"/>
             </a:pPr>
             <a:r>
-              <a:rPr lang="en-GB" altLang="da-DK" sz="1600" dirty="0"/>
+              <a:rPr lang="en-GB" altLang="da-DK" sz="1600" b="1" dirty="0"/>
               <a:t>In </a:t>
             </a:r>
             <a:r>
-              <a:rPr lang="en-GB" altLang="da-DK" sz="1600" dirty="0" smtClean="0"/>
+              <a:rPr lang="en-GB" altLang="da-DK" sz="1600" b="1" dirty="0" smtClean="0"/>
               <a:t>one round, </a:t>
             </a:r>
             <a:r>
-              <a:rPr lang="en-GB" altLang="da-DK" sz="1600" dirty="0"/>
+              <a:rPr lang="en-GB" altLang="da-DK" sz="1600" b="1" dirty="0"/>
               <a:t>you focus primarily on </a:t>
             </a:r>
             <a:r>
-              <a:rPr lang="en-GB" altLang="da-DK" sz="1600" dirty="0" smtClean="0"/>
+              <a:rPr lang="en-GB" altLang="da-DK" sz="1600" b="1" dirty="0" smtClean="0"/>
               <a:t>grammatical errors</a:t>
             </a:r>
           </a:p>
@@ -17905,8 +17890,16 @@
               <a:defRPr sz="3072"/>
             </a:pPr>
             <a:r>
-              <a:rPr lang="en-GB" altLang="da-DK" sz="1600" dirty="0" smtClean="0"/>
-              <a:t>In one round, you focus om simplification of the text (short sentences etc.)</a:t>
+              <a:rPr lang="en-GB" altLang="da-DK" sz="1600" b="1" dirty="0" smtClean="0"/>
+              <a:t>In </a:t>
+            </a:r>
+            <a:r>
+              <a:rPr lang="en-GB" altLang="da-DK" sz="1600" b="1" dirty="0" smtClean="0"/>
+              <a:t>one </a:t>
+            </a:r>
+            <a:r>
+              <a:rPr lang="en-GB" altLang="da-DK" sz="1600" b="1" dirty="0" smtClean="0"/>
+              <a:t>round, you focus om simplification of the text (short sentences etc.)</a:t>
             </a:r>
           </a:p>
           <a:p>
@@ -17917,10 +17910,9 @@
               <a:defRPr sz="3072"/>
             </a:pPr>
             <a:r>
-              <a:rPr lang="en-GB" altLang="da-DK" sz="1600" dirty="0" smtClean="0"/>
-              <a:t>In one round, you focus on punctuation (commas and full stops)</a:t>
-            </a:r>
-            <a:endParaRPr lang="en-GB" altLang="da-DK" sz="1600" dirty="0"/>
+              <a:rPr lang="en-GB" altLang="da-DK" sz="1600" b="1" dirty="0"/>
+              <a:t>In one round, you check that you use the terminology, you have introduced</a:t>
+            </a:r>
           </a:p>
           <a:p>
             <a:pPr marL="728663" lvl="1" indent="-271463" defTabSz="560831">
@@ -17930,8 +17922,8 @@
               <a:defRPr sz="3072"/>
             </a:pPr>
             <a:r>
-              <a:rPr lang="en-GB" altLang="da-DK" sz="1600" dirty="0" smtClean="0"/>
-              <a:t>In one round, you check all your tables and figures</a:t>
+              <a:rPr lang="en-GB" altLang="da-DK" sz="1600" b="1" dirty="0"/>
+              <a:t>In one round, you check all your proofs</a:t>
             </a:r>
           </a:p>
           <a:p>
@@ -17954,9 +17946,50 @@
               <a:defRPr sz="3072"/>
             </a:pPr>
             <a:r>
+              <a:rPr lang="en-GB" altLang="da-DK" sz="1600" dirty="0"/>
+              <a:t>In one round, you check all your tables and figures</a:t>
+            </a:r>
+          </a:p>
+          <a:p>
+            <a:pPr marL="728663" lvl="1" indent="-271463" defTabSz="560831">
+              <a:spcBef>
+                <a:spcPts val="300"/>
+              </a:spcBef>
+              <a:defRPr sz="3072"/>
+            </a:pPr>
+            <a:r>
+              <a:rPr lang="en-GB" altLang="da-DK" sz="1600" dirty="0"/>
+              <a:t>In one round, you check that all section headings are consistent</a:t>
+            </a:r>
+          </a:p>
+          <a:p>
+            <a:pPr marL="728663" lvl="1" indent="-271463" defTabSz="560831">
+              <a:spcBef>
+                <a:spcPts val="300"/>
+              </a:spcBef>
+              <a:defRPr sz="3072"/>
+            </a:pPr>
+            <a:r>
+              <a:rPr lang="en-GB" altLang="da-DK" sz="1600" dirty="0"/>
+              <a:t>In one round, you check all your references</a:t>
+            </a:r>
+          </a:p>
+          <a:p>
+            <a:pPr marL="728663" lvl="1" indent="-271463" defTabSz="560831">
+              <a:spcBef>
+                <a:spcPts val="300"/>
+              </a:spcBef>
+              <a:defRPr sz="3072"/>
+            </a:pPr>
+            <a:r>
               <a:rPr lang="en-GB" altLang="da-DK" sz="1600" dirty="0" smtClean="0"/>
-              <a:t>In one round, you check that all section headings are consistent</a:t>
-            </a:r>
+              <a:t>In one </a:t>
+            </a:r>
+            <a:r>
+              <a:rPr lang="en-GB" altLang="da-DK" sz="1600" dirty="0" smtClean="0"/>
+              <a:t>round, you focus on punctuation (commas and full stops)</a:t>
+            </a:r>
+            <a:endParaRPr lang="en-GB" altLang="da-DK" sz="1600" dirty="0"/>
           </a:p>
           <a:p>
             <a:pPr marL="728663" lvl="1" indent="-271463" defTabSz="560831">
@@ -17967,44 +18000,9 @@
             </a:pPr>
             <a:r>
               <a:rPr lang="en-GB" altLang="da-DK" sz="1600" dirty="0" smtClean="0"/>
-              <a:t>In one round, you check all your references</a:t>
-            </a:r>
-          </a:p>
-          <a:p>
-            <a:pPr marL="728663" lvl="1" indent="-271463" defTabSz="560831">
-              <a:spcBef>
-                <a:spcPts val="300"/>
-              </a:spcBef>
-              <a:defRPr sz="3072"/>
-            </a:pPr>
-            <a:r>
-              <a:rPr lang="en-GB" altLang="da-DK" sz="1600" dirty="0" smtClean="0"/>
-              <a:t>In one round, you check all your proofs</a:t>
-            </a:r>
-          </a:p>
-          <a:p>
-            <a:pPr marL="728663" lvl="1" indent="-271463" defTabSz="560831">
-              <a:spcBef>
-                <a:spcPts val="300"/>
-              </a:spcBef>
-              <a:defRPr sz="3072"/>
-            </a:pPr>
-            <a:r>
-              <a:rPr lang="en-GB" altLang="da-DK" sz="1600" dirty="0" smtClean="0"/>
-              <a:t>In one round, you check that you use the terminology, you have introduced</a:t>
-            </a:r>
-          </a:p>
-          <a:p>
-            <a:pPr marL="728663" lvl="1" indent="-271463" defTabSz="560831">
-              <a:spcBef>
-                <a:spcPts val="300"/>
-              </a:spcBef>
-              <a:defRPr sz="3072"/>
-            </a:pPr>
-            <a:r>
-              <a:rPr lang="en-GB" altLang="da-DK" sz="1600" dirty="0" smtClean="0"/>
-              <a:t>And so on</a:t>
-            </a:r>
+              <a:t>………</a:t>
+            </a:r>
+            <a:endParaRPr lang="en-GB" altLang="da-DK" sz="1600" dirty="0" smtClean="0"/>
           </a:p>
           <a:p>
             <a:pPr marL="271463" lvl="1" indent="-271463" defTabSz="560831">
@@ -18364,6 +18362,201 @@
           </a:p>
         </p:txBody>
       </p:sp>
+      <p:sp>
+        <p:nvSpPr>
+          <p:cNvPr id="5" name="Rectangle 4"/>
+          <p:cNvSpPr/>
+          <p:nvPr/>
+        </p:nvSpPr>
+        <p:spPr>
+          <a:xfrm rot="21165640">
+            <a:off x="2802601" y="5383481"/>
+            <a:ext cx="2489509" cy="646331"/>
+          </a:xfrm>
+          <a:prstGeom prst="rect">
+            <a:avLst/>
+          </a:prstGeom>
+          <a:noFill/>
+        </p:spPr>
+        <p:txBody>
+          <a:bodyPr>
+            <a:spAutoFit/>
+            <a:scene3d>
+              <a:camera prst="orthographicFront"/>
+              <a:lightRig rig="flat" dir="tl">
+                <a:rot lat="0" lon="0" rev="6600000"/>
+              </a:lightRig>
+            </a:scene3d>
+            <a:sp3d extrusionH="25400" contourW="8890">
+              <a:bevelT w="38100" h="31750"/>
+              <a:contourClr>
+                <a:schemeClr val="accent2">
+                  <a:shade val="75000"/>
+                </a:schemeClr>
+              </a:contourClr>
+            </a:sp3d>
+          </a:bodyPr>
+          <a:lstStyle>
+            <a:defPPr>
+              <a:defRPr lang="da-DK"/>
+            </a:defPPr>
+            <a:lvl1pPr algn="l" rtl="0" fontAlgn="base">
+              <a:spcBef>
+                <a:spcPct val="0"/>
+              </a:spcBef>
+              <a:spcAft>
+                <a:spcPct val="0"/>
+              </a:spcAft>
+              <a:defRPr sz="2000" kern="1200">
+                <a:solidFill>
+                  <a:srgbClr val="A50021"/>
+                </a:solidFill>
+                <a:latin typeface="Arial" charset="0"/>
+                <a:ea typeface="ＭＳ Ｐゴシック" pitchFamily="34" charset="-128"/>
+                <a:cs typeface="+mn-cs"/>
+              </a:defRPr>
+            </a:lvl1pPr>
+            <a:lvl2pPr marL="457200" algn="l" rtl="0" fontAlgn="base">
+              <a:spcBef>
+                <a:spcPct val="0"/>
+              </a:spcBef>
+              <a:spcAft>
+                <a:spcPct val="0"/>
+              </a:spcAft>
+              <a:defRPr sz="2000" kern="1200">
+                <a:solidFill>
+                  <a:srgbClr val="A50021"/>
+                </a:solidFill>
+                <a:latin typeface="Arial" charset="0"/>
+                <a:ea typeface="ＭＳ Ｐゴシック" pitchFamily="34" charset="-128"/>
+                <a:cs typeface="+mn-cs"/>
+              </a:defRPr>
+            </a:lvl2pPr>
+            <a:lvl3pPr marL="914400" algn="l" rtl="0" fontAlgn="base">
+              <a:spcBef>
+                <a:spcPct val="0"/>
+              </a:spcBef>
+              <a:spcAft>
+                <a:spcPct val="0"/>
+              </a:spcAft>
+              <a:defRPr sz="2000" kern="1200">
+                <a:solidFill>
+                  <a:srgbClr val="A50021"/>
+                </a:solidFill>
+                <a:latin typeface="Arial" charset="0"/>
+                <a:ea typeface="ＭＳ Ｐゴシック" pitchFamily="34" charset="-128"/>
+                <a:cs typeface="+mn-cs"/>
+              </a:defRPr>
+            </a:lvl3pPr>
+            <a:lvl4pPr marL="1371600" algn="l" rtl="0" fontAlgn="base">
+              <a:spcBef>
+                <a:spcPct val="0"/>
+              </a:spcBef>
+              <a:spcAft>
+                <a:spcPct val="0"/>
+              </a:spcAft>
+              <a:defRPr sz="2000" kern="1200">
+                <a:solidFill>
+                  <a:srgbClr val="A50021"/>
+                </a:solidFill>
+                <a:latin typeface="Arial" charset="0"/>
+                <a:ea typeface="ＭＳ Ｐゴシック" pitchFamily="34" charset="-128"/>
+                <a:cs typeface="+mn-cs"/>
+              </a:defRPr>
+            </a:lvl4pPr>
+            <a:lvl5pPr marL="1828800" algn="l" rtl="0" fontAlgn="base">
+              <a:spcBef>
+                <a:spcPct val="0"/>
+              </a:spcBef>
+              <a:spcAft>
+                <a:spcPct val="0"/>
+              </a:spcAft>
+              <a:defRPr sz="2000" kern="1200">
+                <a:solidFill>
+                  <a:srgbClr val="A50021"/>
+                </a:solidFill>
+                <a:latin typeface="Arial" charset="0"/>
+                <a:ea typeface="ＭＳ Ｐゴシック" pitchFamily="34" charset="-128"/>
+                <a:cs typeface="+mn-cs"/>
+              </a:defRPr>
+            </a:lvl5pPr>
+            <a:lvl6pPr marL="2286000" algn="l" defTabSz="914400" rtl="0" eaLnBrk="1" latinLnBrk="0" hangingPunct="1">
+              <a:defRPr sz="2000" kern="1200">
+                <a:solidFill>
+                  <a:srgbClr val="A50021"/>
+                </a:solidFill>
+                <a:latin typeface="Arial" charset="0"/>
+                <a:ea typeface="ＭＳ Ｐゴシック" pitchFamily="34" charset="-128"/>
+                <a:cs typeface="+mn-cs"/>
+              </a:defRPr>
+            </a:lvl6pPr>
+            <a:lvl7pPr marL="2743200" algn="l" defTabSz="914400" rtl="0" eaLnBrk="1" latinLnBrk="0" hangingPunct="1">
+              <a:defRPr sz="2000" kern="1200">
+                <a:solidFill>
+                  <a:srgbClr val="A50021"/>
+                </a:solidFill>
+                <a:latin typeface="Arial" charset="0"/>
+                <a:ea typeface="ＭＳ Ｐゴシック" pitchFamily="34" charset="-128"/>
+                <a:cs typeface="+mn-cs"/>
+              </a:defRPr>
+            </a:lvl7pPr>
+            <a:lvl8pPr marL="3200400" algn="l" defTabSz="914400" rtl="0" eaLnBrk="1" latinLnBrk="0" hangingPunct="1">
+              <a:defRPr sz="2000" kern="1200">
+                <a:solidFill>
+                  <a:srgbClr val="A50021"/>
+                </a:solidFill>
+                <a:latin typeface="Arial" charset="0"/>
+                <a:ea typeface="ＭＳ Ｐゴシック" pitchFamily="34" charset="-128"/>
+                <a:cs typeface="+mn-cs"/>
+              </a:defRPr>
+            </a:lvl8pPr>
+            <a:lvl9pPr marL="3657600" algn="l" defTabSz="914400" rtl="0" eaLnBrk="1" latinLnBrk="0" hangingPunct="1">
+              <a:defRPr sz="2000" kern="1200">
+                <a:solidFill>
+                  <a:srgbClr val="A50021"/>
+                </a:solidFill>
+                <a:latin typeface="Arial" charset="0"/>
+                <a:ea typeface="ＭＳ Ｐゴシック" pitchFamily="34" charset="-128"/>
+                <a:cs typeface="+mn-cs"/>
+              </a:defRPr>
+            </a:lvl9pPr>
+          </a:lstStyle>
+          <a:p>
+            <a:pPr algn="ctr">
+              <a:defRPr/>
+            </a:pPr>
+            <a:r>
+              <a:rPr lang="en-US" sz="3600" b="1" dirty="0" smtClean="0">
+                <a:ln w="11430"/>
+                <a:solidFill>
+                  <a:srgbClr val="CC0000"/>
+                </a:solidFill>
+                <a:effectLst>
+                  <a:outerShdw blurRad="50800" dist="39000" dir="5460000" algn="tl">
+                    <a:srgbClr val="000000">
+                      <a:alpha val="38000"/>
+                    </a:srgbClr>
+                  </a:outerShdw>
+                </a:effectLst>
+              </a:rPr>
+              <a:t>Pause</a:t>
+            </a:r>
+            <a:endParaRPr lang="en-US" sz="3600" b="1" dirty="0">
+              <a:ln w="11430"/>
+              <a:solidFill>
+                <a:srgbClr val="CC0000"/>
+              </a:solidFill>
+              <a:effectLst>
+                <a:outerShdw blurRad="50800" dist="39000" dir="5460000" algn="tl">
+                  <a:srgbClr val="000000">
+                    <a:alpha val="38000"/>
+                  </a:srgbClr>
+                </a:outerShdw>
+              </a:effectLst>
+            </a:endParaRPr>
+          </a:p>
+        </p:txBody>
+      </p:sp>
     </p:spTree>
     <p:extLst>
       <p:ext uri="{BB962C8B-B14F-4D97-AF65-F5344CB8AC3E}">
@@ -20661,7 +20854,19 @@
             </a:r>
             <a:r>
               <a:rPr lang="en-GB" altLang="da-DK" sz="1600" dirty="0" smtClean="0"/>
-              <a:t>readers – including the censor – </a:t>
+              <a:t>readers – </a:t>
+            </a:r>
+            <a:r>
+              <a:rPr lang="en-GB" altLang="da-DK" sz="1600" b="1" dirty="0" smtClean="0">
+                <a:solidFill>
+                  <a:srgbClr val="008000"/>
+                </a:solidFill>
+              </a:rPr>
+              <a:t>including the censor</a:t>
+            </a:r>
+            <a:r>
+              <a:rPr lang="en-GB" altLang="da-DK" sz="1600" dirty="0" smtClean="0"/>
+              <a:t> – </a:t>
             </a:r>
             <a:r>
               <a:rPr lang="en-GB" altLang="da-DK" sz="1600" dirty="0"/>
@@ -22976,53 +23181,41 @@
                 <a:latin typeface="+mn-lt"/>
                 <a:ea typeface="+mn-ea"/>
               </a:rPr>
-              <a:t>As an example it is very important </a:t>
-            </a:r>
-            <a:r>
-              <a:rPr lang="en-US" sz="1600" dirty="0"/>
-              <a:t>be </a:t>
-            </a:r>
-            <a:r>
-              <a:rPr lang="en-US" sz="1600" b="1" dirty="0">
-                <a:solidFill>
-                  <a:srgbClr val="008000"/>
-                </a:solidFill>
-              </a:rPr>
-              <a:t>crystal clear</a:t>
-            </a:r>
-            <a:r>
-              <a:rPr lang="en-US" sz="1600" dirty="0"/>
-              <a:t> whether this is the work of other researchers or your own </a:t>
-            </a:r>
-            <a:r>
-              <a:rPr lang="en-US" sz="1600" dirty="0" smtClean="0"/>
-              <a:t>work</a:t>
-            </a:r>
-          </a:p>
-          <a:p>
-            <a:pPr marL="728663" lvl="1" indent="-271463">
-              <a:spcBef>
-                <a:spcPts val="300"/>
-              </a:spcBef>
-              <a:buFont typeface="Arial" panose="020B0604020202020204" pitchFamily="34" charset="0"/>
-              <a:buChar char="–"/>
-            </a:pPr>
-            <a:r>
-              <a:rPr lang="en-GB" altLang="da-DK" sz="1600" b="1" dirty="0">
-                <a:solidFill>
-                  <a:srgbClr val="008000"/>
-                </a:solidFill>
+              <a:t>As an </a:t>
+            </a:r>
+            <a:r>
+              <a:rPr lang="en-GB" altLang="da-DK" sz="1600" dirty="0" smtClean="0">
                 <a:latin typeface="+mn-lt"/>
                 <a:ea typeface="+mn-ea"/>
               </a:rPr>
-              <a:t>Provide arguments</a:t>
+              <a:t>example, </a:t>
             </a:r>
             <a:r>
               <a:rPr lang="en-GB" altLang="da-DK" sz="1600" dirty="0">
                 <a:latin typeface="+mn-lt"/>
                 <a:ea typeface="+mn-ea"/>
               </a:rPr>
-              <a:t> – not postulates</a:t>
+              <a:t>it is very important </a:t>
+            </a:r>
+            <a:r>
+              <a:rPr lang="en-US" sz="1600" dirty="0"/>
+              <a:t>be </a:t>
+            </a:r>
+            <a:r>
+              <a:rPr lang="en-US" sz="1600" b="1" dirty="0">
+                <a:solidFill>
+                  <a:srgbClr val="008000"/>
+                </a:solidFill>
+              </a:rPr>
+              <a:t>crystal clear</a:t>
+            </a:r>
+            <a:r>
+              <a:rPr lang="en-US" sz="1600" dirty="0"/>
+              <a:t> whether this is the work of other researchers or your own </a:t>
+            </a:r>
+            <a:r>
+              <a:rPr lang="en-US" sz="1600" dirty="0" smtClean="0"/>
+              <a:t>work</a:t>
             </a:r>
           </a:p>
           <a:p>
@@ -23033,29 +23226,38 @@
               <a:buFont typeface="Arial" panose="020B0604020202020204" pitchFamily="34" charset="0"/>
               <a:buChar char="–"/>
             </a:pPr>
+            <a:r>
+              <a:rPr lang="en-GB" altLang="da-DK" sz="1600" b="1" dirty="0">
+                <a:solidFill>
+                  <a:srgbClr val="008000"/>
+                </a:solidFill>
+                <a:latin typeface="+mn-lt"/>
+                <a:ea typeface="+mn-ea"/>
+              </a:rPr>
+              <a:t>Provide arguments</a:t>
+            </a:r>
             <a:r>
               <a:rPr lang="en-GB" altLang="da-DK" sz="1600" dirty="0">
                 <a:latin typeface="+mn-lt"/>
                 <a:ea typeface="+mn-ea"/>
               </a:rPr>
-              <a:t>Try to be as </a:t>
-            </a:r>
-            <a:r>
-              <a:rPr lang="en-GB" altLang="da-DK" sz="1600" b="1" dirty="0">
-                <a:solidFill>
-                  <a:srgbClr val="008000"/>
-                </a:solidFill>
-                <a:latin typeface="+mn-lt"/>
-                <a:ea typeface="+mn-ea"/>
-              </a:rPr>
-              <a:t>precise</a:t>
-            </a:r>
+              <a:t> – not postulates</a:t>
+            </a:r>
+          </a:p>
+          <a:p>
+            <a:pPr marL="728663" lvl="1" indent="-271463">
+              <a:spcBef>
+                <a:spcPts val="300"/>
+              </a:spcBef>
+              <a:buFont typeface="Arial" panose="020B0604020202020204" pitchFamily="34" charset="0"/>
+              <a:buChar char="–"/>
+            </a:pPr>
             <a:r>
               <a:rPr lang="en-GB" altLang="da-DK" sz="1600" dirty="0">
                 <a:latin typeface="+mn-lt"/>
                 <a:ea typeface="+mn-ea"/>
               </a:rPr>
-              <a:t> and </a:t>
+              <a:t>Use the </a:t>
             </a:r>
             <a:r>
               <a:rPr lang="en-GB" altLang="da-DK" sz="1600" b="1" dirty="0">
@@ -23065,30 +23267,47 @@
                 <a:latin typeface="+mn-lt"/>
                 <a:ea typeface="+mn-ea"/>
               </a:rPr>
-              <a:t>consistent</a:t>
+              <a:t>correct terminology</a:t>
+            </a:r>
+          </a:p>
+          <a:p>
+            <a:pPr marL="728663" lvl="1" indent="-271463">
+              <a:spcBef>
+                <a:spcPts val="300"/>
+              </a:spcBef>
+              <a:buFont typeface="Arial" panose="020B0604020202020204" pitchFamily="34" charset="0"/>
+              <a:buChar char="–"/>
+            </a:pPr>
+            <a:r>
+              <a:rPr lang="en-GB" altLang="da-DK" sz="1600" dirty="0" smtClean="0">
+                <a:latin typeface="+mn-lt"/>
+                <a:ea typeface="+mn-ea"/>
+              </a:rPr>
+              <a:t>Try </a:t>
             </a:r>
             <a:r>
               <a:rPr lang="en-GB" altLang="da-DK" sz="1600" dirty="0">
                 <a:latin typeface="+mn-lt"/>
                 <a:ea typeface="+mn-ea"/>
               </a:rPr>
-              <a:t> as possible without unnecessary repetitions</a:t>
-            </a:r>
-          </a:p>
-          <a:p>
-            <a:pPr marL="728663" lvl="1" indent="-271463">
-              <a:spcBef>
-                <a:spcPts val="300"/>
-              </a:spcBef>
-              <a:buFont typeface="Arial" panose="020B0604020202020204" pitchFamily="34" charset="0"/>
-              <a:buChar char="–"/>
-            </a:pPr>
+              <a:t>to be as </a:t>
+            </a:r>
+            <a:r>
+              <a:rPr lang="en-GB" altLang="da-DK" sz="1600" b="1" dirty="0">
+                <a:solidFill>
+                  <a:srgbClr val="008000"/>
+                </a:solidFill>
+                <a:latin typeface="+mn-lt"/>
+                <a:ea typeface="+mn-ea"/>
+              </a:rPr>
+              <a:t>precise</a:t>
+            </a:r>
             <a:r>
               <a:rPr lang="en-GB" altLang="da-DK" sz="1600" dirty="0">
                 <a:latin typeface="+mn-lt"/>
                 <a:ea typeface="+mn-ea"/>
               </a:rPr>
-              <a:t>Use the </a:t>
+              <a:t> and </a:t>
             </a:r>
             <a:r>
               <a:rPr lang="en-GB" altLang="da-DK" sz="1600" b="1" dirty="0">
@@ -23098,7 +23317,14 @@
                 <a:latin typeface="+mn-lt"/>
                 <a:ea typeface="+mn-ea"/>
               </a:rPr>
-              <a:t>correct terminology</a:t>
+              <a:t>consistent</a:t>
+            </a:r>
+            <a:r>
+              <a:rPr lang="en-GB" altLang="da-DK" sz="1600" dirty="0">
+                <a:latin typeface="+mn-lt"/>
+                <a:ea typeface="+mn-ea"/>
+              </a:rPr>
+              <a:t> as possible without unnecessary repetitions</a:t>
             </a:r>
           </a:p>
           <a:p>
@@ -23461,15 +23687,7 @@
             </a:r>
             <a:r>
               <a:rPr lang="en-GB" altLang="da-DK" sz="2800" dirty="0" smtClean="0"/>
-              <a:t>make </a:t>
-            </a:r>
-            <a:r>
-              <a:rPr lang="en-GB" altLang="da-DK" sz="2800" dirty="0" smtClean="0"/>
-              <a:t>an </a:t>
-            </a:r>
-            <a:r>
-              <a:rPr lang="en-GB" altLang="da-DK" sz="2800" dirty="0" smtClean="0"/>
-              <a:t>oral presentation?</a:t>
+              <a:t>make an oral presentation?</a:t>
             </a:r>
             <a:endParaRPr lang="en-GB" altLang="da-DK" sz="2800" dirty="0"/>
           </a:p>
@@ -23807,7 +24025,17 @@
                 <a:latin typeface="Arial" pitchFamily="34" charset="0"/>
                 <a:ea typeface="ＭＳ Ｐゴシック" pitchFamily="34" charset="-128"/>
               </a:rPr>
-              <a:t>June 9 at 13.00</a:t>
+              <a:t>Monday June </a:t>
+            </a:r>
+            <a:r>
+              <a:rPr lang="en-GB" sz="1500" b="1" kern="1200" dirty="0" smtClean="0">
+                <a:solidFill>
+                  <a:srgbClr val="008000"/>
+                </a:solidFill>
+                <a:latin typeface="Arial" pitchFamily="34" charset="0"/>
+                <a:ea typeface="ＭＳ Ｐゴシック" pitchFamily="34" charset="-128"/>
+              </a:rPr>
+              <a:t>9 at 13.00</a:t>
             </a:r>
             <a:endParaRPr lang="en-GB" sz="1500" kern="1200" dirty="0" smtClean="0">
               <a:solidFill>
@@ -23886,6 +24114,10 @@
               </a:rPr>
               <a:t>)</a:t>
             </a:r>
+            <a:endParaRPr lang="en-GB" sz="1500" spc="-70" dirty="0" smtClean="0">
+              <a:latin typeface="Arial" pitchFamily="34" charset="0"/>
+              <a:ea typeface="ＭＳ Ｐゴシック" pitchFamily="34" charset="-128"/>
+            </a:endParaRPr>
           </a:p>
           <a:p>
             <a:pPr marL="1128713" lvl="2" indent="-271463">
@@ -26990,7 +27222,7 @@
         <p:spPr bwMode="auto">
           <a:xfrm>
             <a:off x="436816" y="1124744"/>
-            <a:ext cx="8455664" cy="4320480"/>
+            <a:ext cx="8455664" cy="4680520"/>
           </a:xfrm>
           <a:prstGeom prst="rect">
             <a:avLst/>
@@ -27393,8 +27625,17 @@
               <a:rPr lang="en-GB" altLang="da-DK" sz="1600" kern="0" dirty="0" smtClean="0">
                 <a:ea typeface="ＭＳ Ｐゴシック" pitchFamily="34" charset="-128"/>
               </a:rPr>
-              <a:t>For videos you should thoroughly test that they start and display as intended</a:t>
-            </a:r>
+              <a:t>For videos you should thoroughly test that they start and display as </a:t>
+            </a:r>
+            <a:r>
+              <a:rPr lang="en-GB" altLang="da-DK" sz="1600" kern="0" dirty="0" smtClean="0">
+                <a:ea typeface="ＭＳ Ｐゴシック" pitchFamily="34" charset="-128"/>
+              </a:rPr>
+              <a:t>intended (on the computer to be used for the presentation)</a:t>
+            </a:r>
+            <a:endParaRPr lang="en-GB" altLang="da-DK" sz="1600" kern="0" dirty="0" smtClean="0">
+              <a:ea typeface="ＭＳ Ｐゴシック" pitchFamily="34" charset="-128"/>
+            </a:endParaRPr>
           </a:p>
           <a:p>
             <a:pPr marL="342900" lvl="1" indent="-342900">
@@ -27480,17 +27721,33 @@
               <a:t>P</a:t>
             </a:r>
             <a:r>
-              <a:rPr lang="en-GB" altLang="da-DK" sz="1600" kern="0" smtClean="0">
-                <a:ea typeface="ＭＳ Ｐゴシック" pitchFamily="34" charset="-128"/>
-              </a:rPr>
-              <a:t>ractise </a:t>
-            </a:r>
-            <a:r>
               <a:rPr lang="en-GB" altLang="da-DK" sz="1600" kern="0" dirty="0" smtClean="0">
                 <a:ea typeface="ＭＳ Ｐゴシック" pitchFamily="34" charset="-128"/>
               </a:rPr>
-              <a:t>it thoroughly on the correct computer – it is very easy to waste a lot of time on technical difficulties without any real gain for your presentation</a:t>
-            </a:r>
+              <a:t>ractise it thoroughly on the correct computer – it is very easy to waste a lot of time on technical difficulties without any real gain for your </a:t>
+            </a:r>
+            <a:r>
+              <a:rPr lang="en-GB" altLang="da-DK" sz="1600" kern="0" dirty="0" smtClean="0">
+                <a:ea typeface="ＭＳ Ｐゴシック" pitchFamily="34" charset="-128"/>
+              </a:rPr>
+              <a:t>presentation</a:t>
+            </a:r>
+          </a:p>
+          <a:p>
+            <a:pPr lvl="1">
+              <a:spcBef>
+                <a:spcPts val="300"/>
+              </a:spcBef>
+            </a:pPr>
+            <a:r>
+              <a:rPr lang="en-GB" altLang="da-DK" sz="1600" kern="0" dirty="0" smtClean="0">
+                <a:ea typeface="ＭＳ Ｐゴシック" pitchFamily="34" charset="-128"/>
+              </a:rPr>
+              <a:t>Sometimes such presentations can be done prior to the exam – ask your advisor</a:t>
+            </a:r>
+            <a:endParaRPr lang="en-GB" altLang="da-DK" sz="1600" kern="0" dirty="0" smtClean="0">
+              <a:ea typeface="ＭＳ Ｐゴシック" pitchFamily="34" charset="-128"/>
+            </a:endParaRPr>
           </a:p>
           <a:p>
             <a:pPr lvl="1">
@@ -29587,32 +29844,13 @@
             </a:r>
             <a:r>
               <a:rPr lang="da-DK" sz="1600" dirty="0"/>
-              <a:t> a Danish and an English version (with </a:t>
-            </a:r>
-            <a:r>
-              <a:rPr lang="da-DK" sz="1600" dirty="0" err="1"/>
-              <a:t>slightly</a:t>
-            </a:r>
-            <a:r>
-              <a:rPr lang="da-DK" sz="1600" dirty="0"/>
-              <a:t> </a:t>
-            </a:r>
-            <a:r>
-              <a:rPr lang="da-DK" sz="1600" dirty="0" err="1"/>
-              <a:t>different</a:t>
-            </a:r>
-            <a:r>
-              <a:rPr lang="da-DK" sz="1600" dirty="0"/>
-              <a:t> </a:t>
-            </a:r>
-            <a:r>
-              <a:rPr lang="da-DK" sz="1600" dirty="0" err="1"/>
-              <a:t>contents</a:t>
+              <a:t> a Danish and an English </a:t>
             </a:r>
             <a:r>
               <a:rPr lang="da-DK" sz="1600" dirty="0" smtClean="0"/>
-              <a:t>)</a:t>
-            </a:r>
+              <a:t>version</a:t>
+            </a:r>
+            <a:endParaRPr lang="da-DK" sz="1600" dirty="0" smtClean="0"/>
           </a:p>
         </p:txBody>
       </p:sp>
@@ -30781,7 +31019,19 @@
             </a:r>
             <a:r>
               <a:rPr lang="en-GB" altLang="da-DK" sz="1600" dirty="0" smtClean="0"/>
-              <a:t>, you may need to skip part of your data collection, restrict your experiments, make a simplified implementation/prototype or develop less theory/proofs</a:t>
+              <a:t>, you may need to </a:t>
+            </a:r>
+            <a:r>
+              <a:rPr lang="en-GB" altLang="da-DK" sz="1600" b="1" dirty="0" smtClean="0">
+                <a:solidFill>
+                  <a:srgbClr val="008000"/>
+                </a:solidFill>
+              </a:rPr>
+              <a:t>skip</a:t>
+            </a:r>
+            <a:r>
+              <a:rPr lang="en-GB" altLang="da-DK" sz="1600" dirty="0" smtClean="0"/>
+              <a:t> part of your data collection, restrict your experiments, make a simplified implementation/prototype or develop less theory/proofs</a:t>
             </a:r>
           </a:p>
           <a:p>

</xml_diff>